<commit_message>
Dokumentation und Präsentation angepasst, neue Grafik für Performance SMI
</commit_message>
<xml_diff>
--- a/Paper_Präsentation/PortfolioZusammenstellungSMI_Blaser_Gruetter.pptx
+++ b/Paper_Präsentation/PortfolioZusammenstellungSMI_Blaser_Gruetter.pptx
@@ -4460,33 +4460,38 @@
           </a:p>
         </p:txBody>
       </p:sp>
-      <p:sp>
-        <p:nvSpPr>
-          <p:cNvPr id="3" name="Inhaltsplatzhalter 2">
+      <p:pic>
+        <p:nvPicPr>
+          <p:cNvPr id="4" name="Inhaltsplatzhalter 3">
             <a:extLst>
               <a:ext uri="{FF2B5EF4-FFF2-40B4-BE49-F238E27FC236}">
-                <a16:creationId xmlns:a16="http://schemas.microsoft.com/office/drawing/2014/main" id="{531BF476-2F1F-4074-924D-7CFAC64DD3D1}"/>
+                <a16:creationId xmlns:a16="http://schemas.microsoft.com/office/drawing/2014/main" id="{1F76E2D5-43AD-49F4-AA7C-BD7881C39C99}"/>
               </a:ext>
             </a:extLst>
           </p:cNvPr>
-          <p:cNvSpPr>
-            <a:spLocks noGrp="1"/>
-          </p:cNvSpPr>
+          <p:cNvPicPr>
+            <a:picLocks noGrp="1" noChangeAspect="1"/>
+          </p:cNvPicPr>
           <p:nvPr>
             <p:ph idx="1"/>
           </p:nvPr>
-        </p:nvSpPr>
-        <p:spPr/>
-        <p:txBody>
-          <a:bodyPr>
-            <a:normAutofit/>
-          </a:bodyPr>
-          <a:lstStyle/>
-          <a:p>
-            <a:endParaRPr lang="de-CH" sz="2800" dirty="0"/>
-          </a:p>
-        </p:txBody>
-      </p:sp>
+        </p:nvPicPr>
+        <p:blipFill>
+          <a:blip r:embed="rId2"/>
+          <a:stretch>
+            <a:fillRect/>
+          </a:stretch>
+        </p:blipFill>
+        <p:spPr>
+          <a:xfrm>
+            <a:off x="2631309" y="2190279"/>
+            <a:ext cx="6929382" cy="4482178"/>
+          </a:xfrm>
+          <a:prstGeom prst="rect">
+            <a:avLst/>
+          </a:prstGeom>
+        </p:spPr>
+      </p:pic>
     </p:spTree>
     <p:extLst>
       <p:ext uri="{BB962C8B-B14F-4D97-AF65-F5344CB8AC3E}">

</xml_diff>

<commit_message>
Ergänzung der Präsentation um Schlussfolgerung
</commit_message>
<xml_diff>
--- a/Paper_Präsentation/PortfolioZusammenstellungSMI_Blaser_Gruetter.pptx
+++ b/Paper_Präsentation/PortfolioZusammenstellungSMI_Blaser_Gruetter.pptx
@@ -4,6 +4,9 @@
   <p:sldMasterIdLst>
     <p:sldMasterId id="2147483660" r:id="rId1"/>
   </p:sldMasterIdLst>
+  <p:notesMasterIdLst>
+    <p:notesMasterId r:id="rId9"/>
+  </p:notesMasterIdLst>
   <p:sldIdLst>
     <p:sldId id="256" r:id="rId2"/>
     <p:sldId id="257" r:id="rId3"/>
@@ -11,6 +14,7 @@
     <p:sldId id="258" r:id="rId5"/>
     <p:sldId id="260" r:id="rId6"/>
     <p:sldId id="261" r:id="rId7"/>
+    <p:sldId id="262" r:id="rId8"/>
   </p:sldIdLst>
   <p:sldSz cx="12192000" cy="6858000"/>
   <p:notesSz cx="6858000" cy="9144000"/>
@@ -117,6 +121,643 @@
 </p:presentation>
 </file>
 
+<file path=ppt/notesMasters/notesMaster1.xml><?xml version="1.0" encoding="utf-8"?>
+<p:notesMaster xmlns:a="http://schemas.openxmlformats.org/drawingml/2006/main" xmlns:r="http://schemas.openxmlformats.org/officeDocument/2006/relationships" xmlns:p="http://schemas.openxmlformats.org/presentationml/2006/main">
+  <p:cSld>
+    <p:bg>
+      <p:bgRef idx="1001">
+        <a:schemeClr val="bg1"/>
+      </p:bgRef>
+    </p:bg>
+    <p:spTree>
+      <p:nvGrpSpPr>
+        <p:cNvPr id="1" name=""/>
+        <p:cNvGrpSpPr/>
+        <p:nvPr/>
+      </p:nvGrpSpPr>
+      <p:grpSpPr>
+        <a:xfrm>
+          <a:off x="0" y="0"/>
+          <a:ext cx="0" cy="0"/>
+          <a:chOff x="0" y="0"/>
+          <a:chExt cx="0" cy="0"/>
+        </a:xfrm>
+      </p:grpSpPr>
+      <p:sp>
+        <p:nvSpPr>
+          <p:cNvPr id="2" name="Kopfzeilenplatzhalter 1"/>
+          <p:cNvSpPr>
+            <a:spLocks noGrp="1"/>
+          </p:cNvSpPr>
+          <p:nvPr>
+            <p:ph type="hdr" sz="quarter"/>
+          </p:nvPr>
+        </p:nvSpPr>
+        <p:spPr>
+          <a:xfrm>
+            <a:off x="0" y="0"/>
+            <a:ext cx="2971800" cy="458788"/>
+          </a:xfrm>
+          <a:prstGeom prst="rect">
+            <a:avLst/>
+          </a:prstGeom>
+        </p:spPr>
+        <p:txBody>
+          <a:bodyPr vert="horz" lIns="91440" tIns="45720" rIns="91440" bIns="45720" rtlCol="0"/>
+          <a:lstStyle>
+            <a:lvl1pPr algn="l">
+              <a:defRPr sz="1200"/>
+            </a:lvl1pPr>
+          </a:lstStyle>
+          <a:p>
+            <a:endParaRPr lang="de-CH"/>
+          </a:p>
+        </p:txBody>
+      </p:sp>
+      <p:sp>
+        <p:nvSpPr>
+          <p:cNvPr id="3" name="Datumsplatzhalter 2"/>
+          <p:cNvSpPr>
+            <a:spLocks noGrp="1"/>
+          </p:cNvSpPr>
+          <p:nvPr>
+            <p:ph type="dt" idx="1"/>
+          </p:nvPr>
+        </p:nvSpPr>
+        <p:spPr>
+          <a:xfrm>
+            <a:off x="3884613" y="0"/>
+            <a:ext cx="2971800" cy="458788"/>
+          </a:xfrm>
+          <a:prstGeom prst="rect">
+            <a:avLst/>
+          </a:prstGeom>
+        </p:spPr>
+        <p:txBody>
+          <a:bodyPr vert="horz" lIns="91440" tIns="45720" rIns="91440" bIns="45720" rtlCol="0"/>
+          <a:lstStyle>
+            <a:lvl1pPr algn="r">
+              <a:defRPr sz="1200"/>
+            </a:lvl1pPr>
+          </a:lstStyle>
+          <a:p>
+            <a:fld id="{4A17FE59-D95E-4412-8759-8D0571CED71B}" type="datetimeFigureOut">
+              <a:rPr lang="de-CH" smtClean="0"/>
+              <a:t>25.05.2020</a:t>
+            </a:fld>
+            <a:endParaRPr lang="de-CH"/>
+          </a:p>
+        </p:txBody>
+      </p:sp>
+      <p:sp>
+        <p:nvSpPr>
+          <p:cNvPr id="4" name="Folienbildplatzhalter 3"/>
+          <p:cNvSpPr>
+            <a:spLocks noGrp="1" noRot="1" noChangeAspect="1"/>
+          </p:cNvSpPr>
+          <p:nvPr>
+            <p:ph type="sldImg" idx="2"/>
+          </p:nvPr>
+        </p:nvSpPr>
+        <p:spPr>
+          <a:xfrm>
+            <a:off x="685800" y="1143000"/>
+            <a:ext cx="5486400" cy="3086100"/>
+          </a:xfrm>
+          <a:prstGeom prst="rect">
+            <a:avLst/>
+          </a:prstGeom>
+          <a:noFill/>
+          <a:ln w="12700">
+            <a:solidFill>
+              <a:prstClr val="black"/>
+            </a:solidFill>
+          </a:ln>
+        </p:spPr>
+        <p:txBody>
+          <a:bodyPr vert="horz" lIns="91440" tIns="45720" rIns="91440" bIns="45720" rtlCol="0" anchor="ctr"/>
+          <a:lstStyle/>
+          <a:p>
+            <a:endParaRPr lang="de-CH"/>
+          </a:p>
+        </p:txBody>
+      </p:sp>
+      <p:sp>
+        <p:nvSpPr>
+          <p:cNvPr id="5" name="Notizenplatzhalter 4"/>
+          <p:cNvSpPr>
+            <a:spLocks noGrp="1"/>
+          </p:cNvSpPr>
+          <p:nvPr>
+            <p:ph type="body" sz="quarter" idx="3"/>
+          </p:nvPr>
+        </p:nvSpPr>
+        <p:spPr>
+          <a:xfrm>
+            <a:off x="685800" y="4400550"/>
+            <a:ext cx="5486400" cy="3600450"/>
+          </a:xfrm>
+          <a:prstGeom prst="rect">
+            <a:avLst/>
+          </a:prstGeom>
+        </p:spPr>
+        <p:txBody>
+          <a:bodyPr vert="horz" lIns="91440" tIns="45720" rIns="91440" bIns="45720" rtlCol="0"/>
+          <a:lstStyle/>
+          <a:p>
+            <a:pPr lvl="0"/>
+            <a:r>
+              <a:rPr lang="de-DE"/>
+              <a:t>Mastertextformat bearbeiten</a:t>
+            </a:r>
+          </a:p>
+          <a:p>
+            <a:pPr lvl="1"/>
+            <a:r>
+              <a:rPr lang="de-DE"/>
+              <a:t>Zweite Ebene</a:t>
+            </a:r>
+          </a:p>
+          <a:p>
+            <a:pPr lvl="2"/>
+            <a:r>
+              <a:rPr lang="de-DE"/>
+              <a:t>Dritte Ebene</a:t>
+            </a:r>
+          </a:p>
+          <a:p>
+            <a:pPr lvl="3"/>
+            <a:r>
+              <a:rPr lang="de-DE"/>
+              <a:t>Vierte Ebene</a:t>
+            </a:r>
+          </a:p>
+          <a:p>
+            <a:pPr lvl="4"/>
+            <a:r>
+              <a:rPr lang="de-DE"/>
+              <a:t>Fünfte Ebene</a:t>
+            </a:r>
+            <a:endParaRPr lang="de-CH"/>
+          </a:p>
+        </p:txBody>
+      </p:sp>
+      <p:sp>
+        <p:nvSpPr>
+          <p:cNvPr id="6" name="Fußzeilenplatzhalter 5"/>
+          <p:cNvSpPr>
+            <a:spLocks noGrp="1"/>
+          </p:cNvSpPr>
+          <p:nvPr>
+            <p:ph type="ftr" sz="quarter" idx="4"/>
+          </p:nvPr>
+        </p:nvSpPr>
+        <p:spPr>
+          <a:xfrm>
+            <a:off x="0" y="8685213"/>
+            <a:ext cx="2971800" cy="458787"/>
+          </a:xfrm>
+          <a:prstGeom prst="rect">
+            <a:avLst/>
+          </a:prstGeom>
+        </p:spPr>
+        <p:txBody>
+          <a:bodyPr vert="horz" lIns="91440" tIns="45720" rIns="91440" bIns="45720" rtlCol="0" anchor="b"/>
+          <a:lstStyle>
+            <a:lvl1pPr algn="l">
+              <a:defRPr sz="1200"/>
+            </a:lvl1pPr>
+          </a:lstStyle>
+          <a:p>
+            <a:endParaRPr lang="de-CH"/>
+          </a:p>
+        </p:txBody>
+      </p:sp>
+      <p:sp>
+        <p:nvSpPr>
+          <p:cNvPr id="7" name="Foliennummernplatzhalter 6"/>
+          <p:cNvSpPr>
+            <a:spLocks noGrp="1"/>
+          </p:cNvSpPr>
+          <p:nvPr>
+            <p:ph type="sldNum" sz="quarter" idx="5"/>
+          </p:nvPr>
+        </p:nvSpPr>
+        <p:spPr>
+          <a:xfrm>
+            <a:off x="3884613" y="8685213"/>
+            <a:ext cx="2971800" cy="458787"/>
+          </a:xfrm>
+          <a:prstGeom prst="rect">
+            <a:avLst/>
+          </a:prstGeom>
+        </p:spPr>
+        <p:txBody>
+          <a:bodyPr vert="horz" lIns="91440" tIns="45720" rIns="91440" bIns="45720" rtlCol="0" anchor="b"/>
+          <a:lstStyle>
+            <a:lvl1pPr algn="r">
+              <a:defRPr sz="1200"/>
+            </a:lvl1pPr>
+          </a:lstStyle>
+          <a:p>
+            <a:fld id="{88147B2E-312E-4F43-A2D4-F58842274618}" type="slidenum">
+              <a:rPr lang="de-CH" smtClean="0"/>
+              <a:t>‹Nr.›</a:t>
+            </a:fld>
+            <a:endParaRPr lang="de-CH"/>
+          </a:p>
+        </p:txBody>
+      </p:sp>
+    </p:spTree>
+    <p:extLst>
+      <p:ext uri="{BB962C8B-B14F-4D97-AF65-F5344CB8AC3E}">
+        <p14:creationId xmlns:p14="http://schemas.microsoft.com/office/powerpoint/2010/main" val="818601264"/>
+      </p:ext>
+    </p:extLst>
+  </p:cSld>
+  <p:clrMap bg1="lt1" tx1="dk1" bg2="lt2" tx2="dk2" accent1="accent1" accent2="accent2" accent3="accent3" accent4="accent4" accent5="accent5" accent6="accent6" hlink="hlink" folHlink="folHlink"/>
+  <p:notesStyle>
+    <a:lvl1pPr marL="0" algn="l" defTabSz="914400" rtl="0" eaLnBrk="1" latinLnBrk="0" hangingPunct="1">
+      <a:defRPr sz="1200" kern="1200">
+        <a:solidFill>
+          <a:schemeClr val="tx1"/>
+        </a:solidFill>
+        <a:latin typeface="+mn-lt"/>
+        <a:ea typeface="+mn-ea"/>
+        <a:cs typeface="+mn-cs"/>
+      </a:defRPr>
+    </a:lvl1pPr>
+    <a:lvl2pPr marL="457200" algn="l" defTabSz="914400" rtl="0" eaLnBrk="1" latinLnBrk="0" hangingPunct="1">
+      <a:defRPr sz="1200" kern="1200">
+        <a:solidFill>
+          <a:schemeClr val="tx1"/>
+        </a:solidFill>
+        <a:latin typeface="+mn-lt"/>
+        <a:ea typeface="+mn-ea"/>
+        <a:cs typeface="+mn-cs"/>
+      </a:defRPr>
+    </a:lvl2pPr>
+    <a:lvl3pPr marL="914400" algn="l" defTabSz="914400" rtl="0" eaLnBrk="1" latinLnBrk="0" hangingPunct="1">
+      <a:defRPr sz="1200" kern="1200">
+        <a:solidFill>
+          <a:schemeClr val="tx1"/>
+        </a:solidFill>
+        <a:latin typeface="+mn-lt"/>
+        <a:ea typeface="+mn-ea"/>
+        <a:cs typeface="+mn-cs"/>
+      </a:defRPr>
+    </a:lvl3pPr>
+    <a:lvl4pPr marL="1371600" algn="l" defTabSz="914400" rtl="0" eaLnBrk="1" latinLnBrk="0" hangingPunct="1">
+      <a:defRPr sz="1200" kern="1200">
+        <a:solidFill>
+          <a:schemeClr val="tx1"/>
+        </a:solidFill>
+        <a:latin typeface="+mn-lt"/>
+        <a:ea typeface="+mn-ea"/>
+        <a:cs typeface="+mn-cs"/>
+      </a:defRPr>
+    </a:lvl4pPr>
+    <a:lvl5pPr marL="1828800" algn="l" defTabSz="914400" rtl="0" eaLnBrk="1" latinLnBrk="0" hangingPunct="1">
+      <a:defRPr sz="1200" kern="1200">
+        <a:solidFill>
+          <a:schemeClr val="tx1"/>
+        </a:solidFill>
+        <a:latin typeface="+mn-lt"/>
+        <a:ea typeface="+mn-ea"/>
+        <a:cs typeface="+mn-cs"/>
+      </a:defRPr>
+    </a:lvl5pPr>
+    <a:lvl6pPr marL="2286000" algn="l" defTabSz="914400" rtl="0" eaLnBrk="1" latinLnBrk="0" hangingPunct="1">
+      <a:defRPr sz="1200" kern="1200">
+        <a:solidFill>
+          <a:schemeClr val="tx1"/>
+        </a:solidFill>
+        <a:latin typeface="+mn-lt"/>
+        <a:ea typeface="+mn-ea"/>
+        <a:cs typeface="+mn-cs"/>
+      </a:defRPr>
+    </a:lvl6pPr>
+    <a:lvl7pPr marL="2743200" algn="l" defTabSz="914400" rtl="0" eaLnBrk="1" latinLnBrk="0" hangingPunct="1">
+      <a:defRPr sz="1200" kern="1200">
+        <a:solidFill>
+          <a:schemeClr val="tx1"/>
+        </a:solidFill>
+        <a:latin typeface="+mn-lt"/>
+        <a:ea typeface="+mn-ea"/>
+        <a:cs typeface="+mn-cs"/>
+      </a:defRPr>
+    </a:lvl7pPr>
+    <a:lvl8pPr marL="3200400" algn="l" defTabSz="914400" rtl="0" eaLnBrk="1" latinLnBrk="0" hangingPunct="1">
+      <a:defRPr sz="1200" kern="1200">
+        <a:solidFill>
+          <a:schemeClr val="tx1"/>
+        </a:solidFill>
+        <a:latin typeface="+mn-lt"/>
+        <a:ea typeface="+mn-ea"/>
+        <a:cs typeface="+mn-cs"/>
+      </a:defRPr>
+    </a:lvl8pPr>
+    <a:lvl9pPr marL="3657600" algn="l" defTabSz="914400" rtl="0" eaLnBrk="1" latinLnBrk="0" hangingPunct="1">
+      <a:defRPr sz="1200" kern="1200">
+        <a:solidFill>
+          <a:schemeClr val="tx1"/>
+        </a:solidFill>
+        <a:latin typeface="+mn-lt"/>
+        <a:ea typeface="+mn-ea"/>
+        <a:cs typeface="+mn-cs"/>
+      </a:defRPr>
+    </a:lvl9pPr>
+  </p:notesStyle>
+</p:notesMaster>
+</file>
+
+<file path=ppt/notesSlides/notesSlide1.xml><?xml version="1.0" encoding="utf-8"?>
+<p:notes xmlns:a="http://schemas.openxmlformats.org/drawingml/2006/main" xmlns:r="http://schemas.openxmlformats.org/officeDocument/2006/relationships" xmlns:p="http://schemas.openxmlformats.org/presentationml/2006/main">
+  <p:cSld>
+    <p:spTree>
+      <p:nvGrpSpPr>
+        <p:cNvPr id="1" name=""/>
+        <p:cNvGrpSpPr/>
+        <p:nvPr/>
+      </p:nvGrpSpPr>
+      <p:grpSpPr>
+        <a:xfrm>
+          <a:off x="0" y="0"/>
+          <a:ext cx="0" cy="0"/>
+          <a:chOff x="0" y="0"/>
+          <a:chExt cx="0" cy="0"/>
+        </a:xfrm>
+      </p:grpSpPr>
+      <p:sp>
+        <p:nvSpPr>
+          <p:cNvPr id="2" name="Folienbildplatzhalter 1"/>
+          <p:cNvSpPr>
+            <a:spLocks noGrp="1" noRot="1" noChangeAspect="1"/>
+          </p:cNvSpPr>
+          <p:nvPr>
+            <p:ph type="sldImg"/>
+          </p:nvPr>
+        </p:nvSpPr>
+        <p:spPr/>
+      </p:sp>
+      <p:sp>
+        <p:nvSpPr>
+          <p:cNvPr id="3" name="Notizenplatzhalter 2"/>
+          <p:cNvSpPr>
+            <a:spLocks noGrp="1"/>
+          </p:cNvSpPr>
+          <p:nvPr>
+            <p:ph type="body" idx="1"/>
+          </p:nvPr>
+        </p:nvSpPr>
+        <p:spPr/>
+        <p:txBody>
+          <a:bodyPr/>
+          <a:lstStyle/>
+          <a:p>
+            <a:r>
+              <a:rPr lang="de-CH" dirty="0"/>
+              <a:t>Hallo miteinander wir begrüssen euch herzlich zu unserer Präsentation. Diese handelt von der Zusammenstellung des optimalen Aktienportfolios aus Aktientitel des SMI.</a:t>
+            </a:r>
+          </a:p>
+        </p:txBody>
+      </p:sp>
+      <p:sp>
+        <p:nvSpPr>
+          <p:cNvPr id="4" name="Foliennummernplatzhalter 3"/>
+          <p:cNvSpPr>
+            <a:spLocks noGrp="1"/>
+          </p:cNvSpPr>
+          <p:nvPr>
+            <p:ph type="sldNum" sz="quarter" idx="5"/>
+          </p:nvPr>
+        </p:nvSpPr>
+        <p:spPr/>
+        <p:txBody>
+          <a:bodyPr/>
+          <a:lstStyle/>
+          <a:p>
+            <a:fld id="{88147B2E-312E-4F43-A2D4-F58842274618}" type="slidenum">
+              <a:rPr lang="de-CH" smtClean="0"/>
+              <a:t>1</a:t>
+            </a:fld>
+            <a:endParaRPr lang="de-CH"/>
+          </a:p>
+        </p:txBody>
+      </p:sp>
+    </p:spTree>
+    <p:extLst>
+      <p:ext uri="{BB962C8B-B14F-4D97-AF65-F5344CB8AC3E}">
+        <p14:creationId xmlns:p14="http://schemas.microsoft.com/office/powerpoint/2010/main" val="290059619"/>
+      </p:ext>
+    </p:extLst>
+  </p:cSld>
+  <p:clrMapOvr>
+    <a:masterClrMapping/>
+  </p:clrMapOvr>
+</p:notes>
+</file>
+
+<file path=ppt/notesSlides/notesSlide2.xml><?xml version="1.0" encoding="utf-8"?>
+<p:notes xmlns:a="http://schemas.openxmlformats.org/drawingml/2006/main" xmlns:r="http://schemas.openxmlformats.org/officeDocument/2006/relationships" xmlns:p="http://schemas.openxmlformats.org/presentationml/2006/main">
+  <p:cSld>
+    <p:spTree>
+      <p:nvGrpSpPr>
+        <p:cNvPr id="1" name=""/>
+        <p:cNvGrpSpPr/>
+        <p:nvPr/>
+      </p:nvGrpSpPr>
+      <p:grpSpPr>
+        <a:xfrm>
+          <a:off x="0" y="0"/>
+          <a:ext cx="0" cy="0"/>
+          <a:chOff x="0" y="0"/>
+          <a:chExt cx="0" cy="0"/>
+        </a:xfrm>
+      </p:grpSpPr>
+      <p:sp>
+        <p:nvSpPr>
+          <p:cNvPr id="2" name="Folienbildplatzhalter 1"/>
+          <p:cNvSpPr>
+            <a:spLocks noGrp="1" noRot="1" noChangeAspect="1"/>
+          </p:cNvSpPr>
+          <p:nvPr>
+            <p:ph type="sldImg"/>
+          </p:nvPr>
+        </p:nvSpPr>
+        <p:spPr/>
+      </p:sp>
+      <p:sp>
+        <p:nvSpPr>
+          <p:cNvPr id="3" name="Notizenplatzhalter 2"/>
+          <p:cNvSpPr>
+            <a:spLocks noGrp="1"/>
+          </p:cNvSpPr>
+          <p:nvPr>
+            <p:ph type="body" idx="1"/>
+          </p:nvPr>
+        </p:nvSpPr>
+        <p:spPr/>
+        <p:txBody>
+          <a:bodyPr/>
+          <a:lstStyle/>
+          <a:p>
+            <a:r>
+              <a:rPr lang="de-CH" dirty="0"/>
+              <a:t>Mit unserer Arbeit wollten wir in erster Linie herausfinden, wie sich das optimale Aktienportfolio aus Aktien des SMI zusammensetzt. Zusätzlich hat uns interessiert, wie sich der Betrag in den nächsten Monaten der betrachteten Periode entwickelt und wie gut unser Aktienportfolio im Vergleich zum  SMI selbst </a:t>
+            </a:r>
+            <a:r>
+              <a:rPr lang="de-CH" dirty="0" err="1"/>
+              <a:t>dahsteht</a:t>
+            </a:r>
+            <a:r>
+              <a:rPr lang="de-CH" dirty="0"/>
+              <a:t>.</a:t>
+            </a:r>
+          </a:p>
+        </p:txBody>
+      </p:sp>
+      <p:sp>
+        <p:nvSpPr>
+          <p:cNvPr id="4" name="Foliennummernplatzhalter 3"/>
+          <p:cNvSpPr>
+            <a:spLocks noGrp="1"/>
+          </p:cNvSpPr>
+          <p:nvPr>
+            <p:ph type="sldNum" sz="quarter" idx="5"/>
+          </p:nvPr>
+        </p:nvSpPr>
+        <p:spPr/>
+        <p:txBody>
+          <a:bodyPr/>
+          <a:lstStyle/>
+          <a:p>
+            <a:fld id="{88147B2E-312E-4F43-A2D4-F58842274618}" type="slidenum">
+              <a:rPr lang="de-CH" smtClean="0"/>
+              <a:t>2</a:t>
+            </a:fld>
+            <a:endParaRPr lang="de-CH"/>
+          </a:p>
+        </p:txBody>
+      </p:sp>
+    </p:spTree>
+    <p:extLst>
+      <p:ext uri="{BB962C8B-B14F-4D97-AF65-F5344CB8AC3E}">
+        <p14:creationId xmlns:p14="http://schemas.microsoft.com/office/powerpoint/2010/main" val="1066489451"/>
+      </p:ext>
+    </p:extLst>
+  </p:cSld>
+  <p:clrMapOvr>
+    <a:masterClrMapping/>
+  </p:clrMapOvr>
+</p:notes>
+</file>
+
+<file path=ppt/notesSlides/notesSlide3.xml><?xml version="1.0" encoding="utf-8"?>
+<p:notes xmlns:a="http://schemas.openxmlformats.org/drawingml/2006/main" xmlns:r="http://schemas.openxmlformats.org/officeDocument/2006/relationships" xmlns:p="http://schemas.openxmlformats.org/presentationml/2006/main">
+  <p:cSld>
+    <p:spTree>
+      <p:nvGrpSpPr>
+        <p:cNvPr id="1" name=""/>
+        <p:cNvGrpSpPr/>
+        <p:nvPr/>
+      </p:nvGrpSpPr>
+      <p:grpSpPr>
+        <a:xfrm>
+          <a:off x="0" y="0"/>
+          <a:ext cx="0" cy="0"/>
+          <a:chOff x="0" y="0"/>
+          <a:chExt cx="0" cy="0"/>
+        </a:xfrm>
+      </p:grpSpPr>
+      <p:sp>
+        <p:nvSpPr>
+          <p:cNvPr id="2" name="Folienbildplatzhalter 1"/>
+          <p:cNvSpPr>
+            <a:spLocks noGrp="1" noRot="1" noChangeAspect="1"/>
+          </p:cNvSpPr>
+          <p:nvPr>
+            <p:ph type="sldImg"/>
+          </p:nvPr>
+        </p:nvSpPr>
+        <p:spPr/>
+      </p:sp>
+      <p:sp>
+        <p:nvSpPr>
+          <p:cNvPr id="3" name="Notizenplatzhalter 2"/>
+          <p:cNvSpPr>
+            <a:spLocks noGrp="1"/>
+          </p:cNvSpPr>
+          <p:nvPr>
+            <p:ph type="body" idx="1"/>
+          </p:nvPr>
+        </p:nvSpPr>
+        <p:spPr/>
+        <p:txBody>
+          <a:bodyPr/>
+          <a:lstStyle/>
+          <a:p>
+            <a:r>
+              <a:rPr lang="de-CH" dirty="0"/>
+              <a:t>Zur Erarbeitung der Ergebnisse haben wir zwei Hauptmethoden verwendet: eine Literatur-Review und die Programmierung in R.</a:t>
+            </a:r>
+          </a:p>
+          <a:p>
+            <a:endParaRPr lang="de-CH" dirty="0"/>
+          </a:p>
+          <a:p>
+            <a:r>
+              <a:rPr lang="de-CH" dirty="0"/>
+              <a:t>In der Literatur-Review haben wir uns das Ziel gesetzt relevante Literatur zum Thema des modernen Portfoliomanagement und zum SMI zu finden.</a:t>
+            </a:r>
+          </a:p>
+          <a:p>
+            <a:endParaRPr lang="de-CH" dirty="0"/>
+          </a:p>
+          <a:p>
+            <a:r>
+              <a:rPr lang="de-CH" dirty="0"/>
+              <a:t>In der R-Programmierung haben wir Konzepte des Portfolio und Performance Analytics sowie aus ARIMA und Forecast verwendet.</a:t>
+            </a:r>
+          </a:p>
+        </p:txBody>
+      </p:sp>
+      <p:sp>
+        <p:nvSpPr>
+          <p:cNvPr id="4" name="Foliennummernplatzhalter 3"/>
+          <p:cNvSpPr>
+            <a:spLocks noGrp="1"/>
+          </p:cNvSpPr>
+          <p:nvPr>
+            <p:ph type="sldNum" sz="quarter" idx="5"/>
+          </p:nvPr>
+        </p:nvSpPr>
+        <p:spPr/>
+        <p:txBody>
+          <a:bodyPr/>
+          <a:lstStyle/>
+          <a:p>
+            <a:fld id="{88147B2E-312E-4F43-A2D4-F58842274618}" type="slidenum">
+              <a:rPr lang="de-CH" smtClean="0"/>
+              <a:t>3</a:t>
+            </a:fld>
+            <a:endParaRPr lang="de-CH"/>
+          </a:p>
+        </p:txBody>
+      </p:sp>
+    </p:spTree>
+    <p:extLst>
+      <p:ext uri="{BB962C8B-B14F-4D97-AF65-F5344CB8AC3E}">
+        <p14:creationId xmlns:p14="http://schemas.microsoft.com/office/powerpoint/2010/main" val="3981580193"/>
+      </p:ext>
+    </p:extLst>
+  </p:cSld>
+  <p:clrMapOvr>
+    <a:masterClrMapping/>
+  </p:clrMapOvr>
+</p:notes>
+</file>
+
 <file path=ppt/slideLayouts/slideLayout1.xml><?xml version="1.0" encoding="utf-8"?>
 <p:sldLayout xmlns:a="http://schemas.openxmlformats.org/drawingml/2006/main" xmlns:r="http://schemas.openxmlformats.org/officeDocument/2006/relationships" xmlns:p="http://schemas.openxmlformats.org/presentationml/2006/main" type="title" preserve="1">
   <p:cSld name="Titelfolie">
@@ -362,7 +1003,7 @@
           <a:p>
             <a:fld id="{30B3ADA6-13F5-4541-92D7-22F4C06E4898}" type="datetimeFigureOut">
               <a:rPr lang="de-CH" smtClean="0"/>
-              <a:t>24.05.2020</a:t>
+              <a:t>25.05.2020</a:t>
             </a:fld>
             <a:endParaRPr lang="de-CH"/>
           </a:p>
@@ -624,7 +1265,7 @@
           <a:p>
             <a:fld id="{30B3ADA6-13F5-4541-92D7-22F4C06E4898}" type="datetimeFigureOut">
               <a:rPr lang="de-CH" smtClean="0"/>
-              <a:t>24.05.2020</a:t>
+              <a:t>25.05.2020</a:t>
             </a:fld>
             <a:endParaRPr lang="de-CH"/>
           </a:p>
@@ -859,7 +1500,7 @@
           <a:p>
             <a:fld id="{30B3ADA6-13F5-4541-92D7-22F4C06E4898}" type="datetimeFigureOut">
               <a:rPr lang="de-CH" smtClean="0"/>
-              <a:t>24.05.2020</a:t>
+              <a:t>25.05.2020</a:t>
             </a:fld>
             <a:endParaRPr lang="de-CH"/>
           </a:p>
@@ -1099,7 +1740,7 @@
           <a:p>
             <a:fld id="{30B3ADA6-13F5-4541-92D7-22F4C06E4898}" type="datetimeFigureOut">
               <a:rPr lang="de-CH" smtClean="0"/>
-              <a:t>24.05.2020</a:t>
+              <a:t>25.05.2020</a:t>
             </a:fld>
             <a:endParaRPr lang="de-CH"/>
           </a:p>
@@ -1406,7 +2047,7 @@
           <a:p>
             <a:fld id="{30B3ADA6-13F5-4541-92D7-22F4C06E4898}" type="datetimeFigureOut">
               <a:rPr lang="de-CH" smtClean="0"/>
-              <a:t>24.05.2020</a:t>
+              <a:t>25.05.2020</a:t>
             </a:fld>
             <a:endParaRPr lang="de-CH"/>
           </a:p>
@@ -1708,7 +2349,7 @@
           <a:p>
             <a:fld id="{30B3ADA6-13F5-4541-92D7-22F4C06E4898}" type="datetimeFigureOut">
               <a:rPr lang="de-CH" smtClean="0"/>
-              <a:t>24.05.2020</a:t>
+              <a:t>25.05.2020</a:t>
             </a:fld>
             <a:endParaRPr lang="de-CH"/>
           </a:p>
@@ -2130,7 +2771,7 @@
           <a:p>
             <a:fld id="{30B3ADA6-13F5-4541-92D7-22F4C06E4898}" type="datetimeFigureOut">
               <a:rPr lang="de-CH" smtClean="0"/>
-              <a:t>24.05.2020</a:t>
+              <a:t>25.05.2020</a:t>
             </a:fld>
             <a:endParaRPr lang="de-CH"/>
           </a:p>
@@ -2292,7 +2933,7 @@
           <a:p>
             <a:fld id="{30B3ADA6-13F5-4541-92D7-22F4C06E4898}" type="datetimeFigureOut">
               <a:rPr lang="de-CH" smtClean="0"/>
-              <a:t>24.05.2020</a:t>
+              <a:t>25.05.2020</a:t>
             </a:fld>
             <a:endParaRPr lang="de-CH"/>
           </a:p>
@@ -2387,7 +3028,7 @@
           <a:p>
             <a:fld id="{30B3ADA6-13F5-4541-92D7-22F4C06E4898}" type="datetimeFigureOut">
               <a:rPr lang="de-CH" smtClean="0"/>
-              <a:t>24.05.2020</a:t>
+              <a:t>25.05.2020</a:t>
             </a:fld>
             <a:endParaRPr lang="de-CH"/>
           </a:p>
@@ -2765,7 +3406,7 @@
           <a:p>
             <a:fld id="{30B3ADA6-13F5-4541-92D7-22F4C06E4898}" type="datetimeFigureOut">
               <a:rPr lang="de-CH" smtClean="0"/>
-              <a:t>24.05.2020</a:t>
+              <a:t>25.05.2020</a:t>
             </a:fld>
             <a:endParaRPr lang="de-CH"/>
           </a:p>
@@ -3054,7 +3695,7 @@
           <a:p>
             <a:fld id="{30B3ADA6-13F5-4541-92D7-22F4C06E4898}" type="datetimeFigureOut">
               <a:rPr lang="de-CH" smtClean="0"/>
-              <a:t>24.05.2020</a:t>
+              <a:t>25.05.2020</a:t>
             </a:fld>
             <a:endParaRPr lang="de-CH"/>
           </a:p>
@@ -3265,7 +3906,7 @@
           <a:p>
             <a:fld id="{30B3ADA6-13F5-4541-92D7-22F4C06E4898}" type="datetimeFigureOut">
               <a:rPr lang="de-CH" smtClean="0"/>
-              <a:t>24.05.2020</a:t>
+              <a:t>25.05.2020</a:t>
             </a:fld>
             <a:endParaRPr lang="de-CH"/>
           </a:p>
@@ -3891,8 +4532,13 @@
           <a:p>
             <a:r>
               <a:rPr lang="de-CH" dirty="0"/>
-              <a:t>Zusammenstellung des optimalen Aktienportfolios aus SMI-Aktien</a:t>
-            </a:r>
+              <a:t>Zusammenstellung des optimalen Aktienportfolios aus Aktien DES </a:t>
+            </a:r>
+            <a:r>
+              <a:rPr lang="de-CH" dirty="0" err="1"/>
+              <a:t>smi</a:t>
+            </a:r>
+            <a:endParaRPr lang="de-CH" dirty="0"/>
           </a:p>
         </p:txBody>
       </p:sp>
@@ -3979,7 +4625,7 @@
           <a:p>
             <a:r>
               <a:rPr lang="de-CH" sz="3200" dirty="0"/>
-              <a:t>Forschungsfragen</a:t>
+              <a:t>Forschungsfragen (F1-F3) und Hypothese (H1)</a:t>
             </a:r>
           </a:p>
         </p:txBody>
@@ -4003,7 +4649,7 @@
         <p:spPr/>
         <p:txBody>
           <a:bodyPr>
-            <a:normAutofit/>
+            <a:normAutofit fontScale="92500"/>
           </a:bodyPr>
           <a:lstStyle/>
           <a:p>
@@ -4021,8 +4667,29 @@
             </a:pPr>
             <a:r>
               <a:rPr lang="de-CH" sz="2800" dirty="0"/>
-              <a:t>F2:	Um welchen Betrag erhöht sich das eingesetzte Kapitel in den nächsten Jahren?</a:t>
-            </a:r>
+              <a:t>H1: Das optimale Portfolio enthält die Aktientitel Givaudan, Swiss Life und Lonza.</a:t>
+            </a:r>
+          </a:p>
+          <a:p>
+            <a:pPr marL="0" indent="0">
+              <a:buNone/>
+            </a:pPr>
+            <a:endParaRPr lang="de-CH" sz="2800" dirty="0"/>
+          </a:p>
+          <a:p>
+            <a:pPr marL="0" indent="0">
+              <a:buNone/>
+            </a:pPr>
+            <a:r>
+              <a:rPr lang="de-CH" sz="2800" dirty="0"/>
+              <a:t>F2:	Um welchen Betrag erhöht sich das eingesetzte Kapitel in den nächsten Monaten?</a:t>
+            </a:r>
+          </a:p>
+          <a:p>
+            <a:pPr marL="0" indent="0">
+              <a:buNone/>
+            </a:pPr>
+            <a:endParaRPr lang="de-CH" sz="2800" dirty="0"/>
           </a:p>
           <a:p>
             <a:pPr marL="0" indent="0">
@@ -4340,7 +5007,7 @@
           <a:p>
             <a:r>
               <a:rPr lang="de-CH" sz="3200" dirty="0"/>
-              <a:t>F2: Um welchen Betrag erhöht sich das eingesetzte Kapitel in den nächsten Jahren?</a:t>
+              <a:t>F2: Um welchen Betrag erhöht sich das eingesetzte Kapitel in den nächsten Monaten?</a:t>
             </a:r>
           </a:p>
         </p:txBody>
@@ -4496,6 +5163,137 @@
     <p:extLst>
       <p:ext uri="{BB962C8B-B14F-4D97-AF65-F5344CB8AC3E}">
         <p14:creationId xmlns:p14="http://schemas.microsoft.com/office/powerpoint/2010/main" val="3454861791"/>
+      </p:ext>
+    </p:extLst>
+  </p:cSld>
+  <p:clrMapOvr>
+    <a:masterClrMapping/>
+  </p:clrMapOvr>
+</p:sld>
+</file>
+
+<file path=ppt/slides/slide7.xml><?xml version="1.0" encoding="utf-8"?>
+<p:sld xmlns:a="http://schemas.openxmlformats.org/drawingml/2006/main" xmlns:r="http://schemas.openxmlformats.org/officeDocument/2006/relationships" xmlns:p="http://schemas.openxmlformats.org/presentationml/2006/main">
+  <p:cSld>
+    <p:spTree>
+      <p:nvGrpSpPr>
+        <p:cNvPr id="1" name=""/>
+        <p:cNvGrpSpPr/>
+        <p:nvPr/>
+      </p:nvGrpSpPr>
+      <p:grpSpPr>
+        <a:xfrm>
+          <a:off x="0" y="0"/>
+          <a:ext cx="0" cy="0"/>
+          <a:chOff x="0" y="0"/>
+          <a:chExt cx="0" cy="0"/>
+        </a:xfrm>
+      </p:grpSpPr>
+      <p:sp>
+        <p:nvSpPr>
+          <p:cNvPr id="2" name="Titel 1">
+            <a:extLst>
+              <a:ext uri="{FF2B5EF4-FFF2-40B4-BE49-F238E27FC236}">
+                <a16:creationId xmlns:a16="http://schemas.microsoft.com/office/drawing/2014/main" id="{EA093C5E-3E68-46F2-8121-4FA538ABFB71}"/>
+              </a:ext>
+            </a:extLst>
+          </p:cNvPr>
+          <p:cNvSpPr>
+            <a:spLocks noGrp="1"/>
+          </p:cNvSpPr>
+          <p:nvPr>
+            <p:ph type="title"/>
+          </p:nvPr>
+        </p:nvSpPr>
+        <p:spPr/>
+        <p:txBody>
+          <a:bodyPr/>
+          <a:lstStyle/>
+          <a:p>
+            <a:r>
+              <a:rPr lang="de-CH" dirty="0"/>
+              <a:t>Schlussfolgerung</a:t>
+            </a:r>
+          </a:p>
+        </p:txBody>
+      </p:sp>
+      <p:sp>
+        <p:nvSpPr>
+          <p:cNvPr id="3" name="Inhaltsplatzhalter 2">
+            <a:extLst>
+              <a:ext uri="{FF2B5EF4-FFF2-40B4-BE49-F238E27FC236}">
+                <a16:creationId xmlns:a16="http://schemas.microsoft.com/office/drawing/2014/main" id="{0CD3B4EB-CA5C-49CF-A309-0CD8A4B81F61}"/>
+              </a:ext>
+            </a:extLst>
+          </p:cNvPr>
+          <p:cNvSpPr>
+            <a:spLocks noGrp="1"/>
+          </p:cNvSpPr>
+          <p:nvPr>
+            <p:ph idx="1"/>
+          </p:nvPr>
+        </p:nvSpPr>
+        <p:spPr/>
+        <p:txBody>
+          <a:bodyPr>
+            <a:normAutofit fontScale="77500" lnSpcReduction="20000"/>
+          </a:bodyPr>
+          <a:lstStyle/>
+          <a:p>
+            <a:r>
+              <a:rPr lang="de-CH" sz="3000" dirty="0"/>
+              <a:t>Die Forschungsfragen F1-F3 konnten in unserer Arbeit beantwortet werden</a:t>
+            </a:r>
+          </a:p>
+          <a:p>
+            <a:pPr lvl="1"/>
+            <a:r>
+              <a:rPr lang="de-CH" sz="3000" dirty="0"/>
+              <a:t>FI: Das optimale Aktienportfolio setzt sich aus den SMI-Aktien: Givaudan, Lonza, Nestle und Swiss Life zusammen</a:t>
+            </a:r>
+          </a:p>
+          <a:p>
+            <a:pPr lvl="1"/>
+            <a:r>
+              <a:rPr lang="de-CH" sz="3000" dirty="0"/>
+              <a:t>F2: Das eingesetzte Kapital erhöht sich in den nächsten Monaten um CHF …</a:t>
+            </a:r>
+          </a:p>
+          <a:p>
+            <a:pPr lvl="1"/>
+            <a:r>
+              <a:rPr lang="de-CH" sz="3000" dirty="0"/>
+              <a:t>F3: Das optimale Aktienportfolio schlägt den SMI selbst um ein Vielfaches</a:t>
+            </a:r>
+          </a:p>
+          <a:p>
+            <a:r>
+              <a:rPr lang="de-CH" sz="3000" dirty="0"/>
+              <a:t>Die Hypothese H1 konnte bestätigt werden</a:t>
+            </a:r>
+          </a:p>
+          <a:p>
+            <a:pPr lvl="1"/>
+            <a:r>
+              <a:rPr lang="de-CH" sz="3000" dirty="0"/>
+              <a:t>Das Aktienportfolio beinhaltet die drei Aktien: Givaudan, Lonza und Swiss Life</a:t>
+            </a:r>
+          </a:p>
+          <a:p>
+            <a:r>
+              <a:rPr lang="de-CH" sz="3000" dirty="0"/>
+              <a:t>Die verwendete Literatur und die angewandten Methoden waren hilfreich</a:t>
+            </a:r>
+          </a:p>
+          <a:p>
+            <a:endParaRPr lang="de-CH" dirty="0"/>
+          </a:p>
+        </p:txBody>
+      </p:sp>
+    </p:spTree>
+    <p:extLst>
+      <p:ext uri="{BB962C8B-B14F-4D97-AF65-F5344CB8AC3E}">
+        <p14:creationId xmlns:p14="http://schemas.microsoft.com/office/powerpoint/2010/main" val="3853321222"/>
       </p:ext>
     </p:extLst>
   </p:cSld>
@@ -4772,4 +5570,299 @@
     </a:ext>
   </a:extLst>
 </a:theme>
+</file>
+
+<file path=ppt/theme/theme2.xml><?xml version="1.0" encoding="utf-8"?>
+<a:theme xmlns:a="http://schemas.openxmlformats.org/drawingml/2006/main" name="Office">
+  <a:themeElements>
+    <a:clrScheme name="Office">
+      <a:dk1>
+        <a:sysClr val="windowText" lastClr="000000"/>
+      </a:dk1>
+      <a:lt1>
+        <a:sysClr val="window" lastClr="FFFFFF"/>
+      </a:lt1>
+      <a:dk2>
+        <a:srgbClr val="44546A"/>
+      </a:dk2>
+      <a:lt2>
+        <a:srgbClr val="E7E6E6"/>
+      </a:lt2>
+      <a:accent1>
+        <a:srgbClr val="4472C4"/>
+      </a:accent1>
+      <a:accent2>
+        <a:srgbClr val="ED7D31"/>
+      </a:accent2>
+      <a:accent3>
+        <a:srgbClr val="A5A5A5"/>
+      </a:accent3>
+      <a:accent4>
+        <a:srgbClr val="FFC000"/>
+      </a:accent4>
+      <a:accent5>
+        <a:srgbClr val="5B9BD5"/>
+      </a:accent5>
+      <a:accent6>
+        <a:srgbClr val="70AD47"/>
+      </a:accent6>
+      <a:hlink>
+        <a:srgbClr val="0563C1"/>
+      </a:hlink>
+      <a:folHlink>
+        <a:srgbClr val="954F72"/>
+      </a:folHlink>
+    </a:clrScheme>
+    <a:fontScheme name="Office">
+      <a:majorFont>
+        <a:latin typeface="Calibri Light" panose="020F0302020204030204"/>
+        <a:ea typeface=""/>
+        <a:cs typeface=""/>
+        <a:font script="Jpan" typeface="游ゴシック Light"/>
+        <a:font script="Hang" typeface="맑은 고딕"/>
+        <a:font script="Hans" typeface="等线 Light"/>
+        <a:font script="Hant" typeface="新細明體"/>
+        <a:font script="Arab" typeface="Times New Roman"/>
+        <a:font script="Hebr" typeface="Times New Roman"/>
+        <a:font script="Thai" typeface="Angsana New"/>
+        <a:font script="Ethi" typeface="Nyala"/>
+        <a:font script="Beng" typeface="Vrinda"/>
+        <a:font script="Gujr" typeface="Shruti"/>
+        <a:font script="Khmr" typeface="MoolBoran"/>
+        <a:font script="Knda" typeface="Tunga"/>
+        <a:font script="Guru" typeface="Raavi"/>
+        <a:font script="Cans" typeface="Euphemia"/>
+        <a:font script="Cher" typeface="Plantagenet Cherokee"/>
+        <a:font script="Yiii" typeface="Microsoft Yi Baiti"/>
+        <a:font script="Tibt" typeface="Microsoft Himalaya"/>
+        <a:font script="Thaa" typeface="MV Boli"/>
+        <a:font script="Deva" typeface="Mangal"/>
+        <a:font script="Telu" typeface="Gautami"/>
+        <a:font script="Taml" typeface="Latha"/>
+        <a:font script="Syrc" typeface="Estrangelo Edessa"/>
+        <a:font script="Orya" typeface="Kalinga"/>
+        <a:font script="Mlym" typeface="Kartika"/>
+        <a:font script="Laoo" typeface="DokChampa"/>
+        <a:font script="Sinh" typeface="Iskoola Pota"/>
+        <a:font script="Mong" typeface="Mongolian Baiti"/>
+        <a:font script="Viet" typeface="Times New Roman"/>
+        <a:font script="Uigh" typeface="Microsoft Uighur"/>
+        <a:font script="Geor" typeface="Sylfaen"/>
+        <a:font script="Armn" typeface="Arial"/>
+        <a:font script="Bugi" typeface="Leelawadee UI"/>
+        <a:font script="Bopo" typeface="Microsoft JhengHei"/>
+        <a:font script="Java" typeface="Javanese Text"/>
+        <a:font script="Lisu" typeface="Segoe UI"/>
+        <a:font script="Mymr" typeface="Myanmar Text"/>
+        <a:font script="Nkoo" typeface="Ebrima"/>
+        <a:font script="Olck" typeface="Nirmala UI"/>
+        <a:font script="Osma" typeface="Ebrima"/>
+        <a:font script="Phag" typeface="Phagspa"/>
+        <a:font script="Syrn" typeface="Estrangelo Edessa"/>
+        <a:font script="Syrj" typeface="Estrangelo Edessa"/>
+        <a:font script="Syre" typeface="Estrangelo Edessa"/>
+        <a:font script="Sora" typeface="Nirmala UI"/>
+        <a:font script="Tale" typeface="Microsoft Tai Le"/>
+        <a:font script="Talu" typeface="Microsoft New Tai Lue"/>
+        <a:font script="Tfng" typeface="Ebrima"/>
+      </a:majorFont>
+      <a:minorFont>
+        <a:latin typeface="Calibri" panose="020F0502020204030204"/>
+        <a:ea typeface=""/>
+        <a:cs typeface=""/>
+        <a:font script="Jpan" typeface="游ゴシック"/>
+        <a:font script="Hang" typeface="맑은 고딕"/>
+        <a:font script="Hans" typeface="等线"/>
+        <a:font script="Hant" typeface="新細明體"/>
+        <a:font script="Arab" typeface="Arial"/>
+        <a:font script="Hebr" typeface="Arial"/>
+        <a:font script="Thai" typeface="Cordia New"/>
+        <a:font script="Ethi" typeface="Nyala"/>
+        <a:font script="Beng" typeface="Vrinda"/>
+        <a:font script="Gujr" typeface="Shruti"/>
+        <a:font script="Khmr" typeface="DaunPenh"/>
+        <a:font script="Knda" typeface="Tunga"/>
+        <a:font script="Guru" typeface="Raavi"/>
+        <a:font script="Cans" typeface="Euphemia"/>
+        <a:font script="Cher" typeface="Plantagenet Cherokee"/>
+        <a:font script="Yiii" typeface="Microsoft Yi Baiti"/>
+        <a:font script="Tibt" typeface="Microsoft Himalaya"/>
+        <a:font script="Thaa" typeface="MV Boli"/>
+        <a:font script="Deva" typeface="Mangal"/>
+        <a:font script="Telu" typeface="Gautami"/>
+        <a:font script="Taml" typeface="Latha"/>
+        <a:font script="Syrc" typeface="Estrangelo Edessa"/>
+        <a:font script="Orya" typeface="Kalinga"/>
+        <a:font script="Mlym" typeface="Kartika"/>
+        <a:font script="Laoo" typeface="DokChampa"/>
+        <a:font script="Sinh" typeface="Iskoola Pota"/>
+        <a:font script="Mong" typeface="Mongolian Baiti"/>
+        <a:font script="Viet" typeface="Arial"/>
+        <a:font script="Uigh" typeface="Microsoft Uighur"/>
+        <a:font script="Geor" typeface="Sylfaen"/>
+        <a:font script="Armn" typeface="Arial"/>
+        <a:font script="Bugi" typeface="Leelawadee UI"/>
+        <a:font script="Bopo" typeface="Microsoft JhengHei"/>
+        <a:font script="Java" typeface="Javanese Text"/>
+        <a:font script="Lisu" typeface="Segoe UI"/>
+        <a:font script="Mymr" typeface="Myanmar Text"/>
+        <a:font script="Nkoo" typeface="Ebrima"/>
+        <a:font script="Olck" typeface="Nirmala UI"/>
+        <a:font script="Osma" typeface="Ebrima"/>
+        <a:font script="Phag" typeface="Phagspa"/>
+        <a:font script="Syrn" typeface="Estrangelo Edessa"/>
+        <a:font script="Syrj" typeface="Estrangelo Edessa"/>
+        <a:font script="Syre" typeface="Estrangelo Edessa"/>
+        <a:font script="Sora" typeface="Nirmala UI"/>
+        <a:font script="Tale" typeface="Microsoft Tai Le"/>
+        <a:font script="Talu" typeface="Microsoft New Tai Lue"/>
+        <a:font script="Tfng" typeface="Ebrima"/>
+      </a:minorFont>
+    </a:fontScheme>
+    <a:fmtScheme name="Office">
+      <a:fillStyleLst>
+        <a:solidFill>
+          <a:schemeClr val="phClr"/>
+        </a:solidFill>
+        <a:gradFill rotWithShape="1">
+          <a:gsLst>
+            <a:gs pos="0">
+              <a:schemeClr val="phClr">
+                <a:lumMod val="110000"/>
+                <a:satMod val="105000"/>
+                <a:tint val="67000"/>
+              </a:schemeClr>
+            </a:gs>
+            <a:gs pos="50000">
+              <a:schemeClr val="phClr">
+                <a:lumMod val="105000"/>
+                <a:satMod val="103000"/>
+                <a:tint val="73000"/>
+              </a:schemeClr>
+            </a:gs>
+            <a:gs pos="100000">
+              <a:schemeClr val="phClr">
+                <a:lumMod val="105000"/>
+                <a:satMod val="109000"/>
+                <a:tint val="81000"/>
+              </a:schemeClr>
+            </a:gs>
+          </a:gsLst>
+          <a:lin ang="5400000" scaled="0"/>
+        </a:gradFill>
+        <a:gradFill rotWithShape="1">
+          <a:gsLst>
+            <a:gs pos="0">
+              <a:schemeClr val="phClr">
+                <a:satMod val="103000"/>
+                <a:lumMod val="102000"/>
+                <a:tint val="94000"/>
+              </a:schemeClr>
+            </a:gs>
+            <a:gs pos="50000">
+              <a:schemeClr val="phClr">
+                <a:satMod val="110000"/>
+                <a:lumMod val="100000"/>
+                <a:shade val="100000"/>
+              </a:schemeClr>
+            </a:gs>
+            <a:gs pos="100000">
+              <a:schemeClr val="phClr">
+                <a:lumMod val="99000"/>
+                <a:satMod val="120000"/>
+                <a:shade val="78000"/>
+              </a:schemeClr>
+            </a:gs>
+          </a:gsLst>
+          <a:lin ang="5400000" scaled="0"/>
+        </a:gradFill>
+      </a:fillStyleLst>
+      <a:lnStyleLst>
+        <a:ln w="6350" cap="flat" cmpd="sng" algn="ctr">
+          <a:solidFill>
+            <a:schemeClr val="phClr"/>
+          </a:solidFill>
+          <a:prstDash val="solid"/>
+          <a:miter lim="800000"/>
+        </a:ln>
+        <a:ln w="12700" cap="flat" cmpd="sng" algn="ctr">
+          <a:solidFill>
+            <a:schemeClr val="phClr"/>
+          </a:solidFill>
+          <a:prstDash val="solid"/>
+          <a:miter lim="800000"/>
+        </a:ln>
+        <a:ln w="19050" cap="flat" cmpd="sng" algn="ctr">
+          <a:solidFill>
+            <a:schemeClr val="phClr"/>
+          </a:solidFill>
+          <a:prstDash val="solid"/>
+          <a:miter lim="800000"/>
+        </a:ln>
+      </a:lnStyleLst>
+      <a:effectStyleLst>
+        <a:effectStyle>
+          <a:effectLst/>
+        </a:effectStyle>
+        <a:effectStyle>
+          <a:effectLst/>
+        </a:effectStyle>
+        <a:effectStyle>
+          <a:effectLst>
+            <a:outerShdw blurRad="57150" dist="19050" dir="5400000" algn="ctr" rotWithShape="0">
+              <a:srgbClr val="000000">
+                <a:alpha val="63000"/>
+              </a:srgbClr>
+            </a:outerShdw>
+          </a:effectLst>
+        </a:effectStyle>
+      </a:effectStyleLst>
+      <a:bgFillStyleLst>
+        <a:solidFill>
+          <a:schemeClr val="phClr"/>
+        </a:solidFill>
+        <a:solidFill>
+          <a:schemeClr val="phClr">
+            <a:tint val="95000"/>
+            <a:satMod val="170000"/>
+          </a:schemeClr>
+        </a:solidFill>
+        <a:gradFill rotWithShape="1">
+          <a:gsLst>
+            <a:gs pos="0">
+              <a:schemeClr val="phClr">
+                <a:tint val="93000"/>
+                <a:satMod val="150000"/>
+                <a:shade val="98000"/>
+                <a:lumMod val="102000"/>
+              </a:schemeClr>
+            </a:gs>
+            <a:gs pos="50000">
+              <a:schemeClr val="phClr">
+                <a:tint val="98000"/>
+                <a:satMod val="130000"/>
+                <a:shade val="90000"/>
+                <a:lumMod val="103000"/>
+              </a:schemeClr>
+            </a:gs>
+            <a:gs pos="100000">
+              <a:schemeClr val="phClr">
+                <a:shade val="63000"/>
+                <a:satMod val="120000"/>
+              </a:schemeClr>
+            </a:gs>
+          </a:gsLst>
+          <a:lin ang="5400000" scaled="0"/>
+        </a:gradFill>
+      </a:bgFillStyleLst>
+    </a:fmtScheme>
+  </a:themeElements>
+  <a:objectDefaults/>
+  <a:extraClrSchemeLst/>
+  <a:extLst>
+    <a:ext uri="{05A4C25C-085E-4340-85A3-A5531E510DB2}">
+      <thm15:themeFamily xmlns:thm15="http://schemas.microsoft.com/office/thememl/2012/main" name="Office Theme" id="{62F939B6-93AF-4DB8-9C6B-D6C7DFDC589F}" vid="{4A3C46E8-61CC-4603-A589-7422A47A8E4A}"/>
+    </a:ext>
+  </a:extLst>
+</a:theme>
 </file>
</xml_diff>